<commit_message>
full working using github auth
</commit_message>
<xml_diff>
--- a/slides/301MicroServicesPresentation.pptx
+++ b/slides/301MicroServicesPresentation.pptx
@@ -106,6 +106,11 @@
       </a:defRPr>
     </a:lvl9pPr>
   </p:defaultTextStyle>
+  <p:extLst>
+    <p:ext uri="{EFAFB233-063F-42B5-8137-9DF3F51BA10A}">
+      <p15:sldGuideLst xmlns:p15="http://schemas.microsoft.com/office/powerpoint/2012/main"/>
+    </p:ext>
+  </p:extLst>
 </p:presentation>
 </file>
 
@@ -274,7 +279,7 @@
           <a:p>
             <a:fld id="{72EA7947-E287-4738-8C82-07CE4F01EF03}" type="datetime2">
               <a:rPr lang="en-US" smtClean="0"/>
-              <a:t>Friday, July 3, 2020</a:t>
+              <a:t>Tuesday, July 7, 2020</a:t>
             </a:fld>
             <a:endParaRPr lang="en-US" dirty="0"/>
           </a:p>
@@ -1310,7 +1315,7 @@
           <a:p>
             <a:fld id="{EE2EBD84-71F4-4271-8C46-0D47C0A9B12E}" type="datetime2">
               <a:rPr lang="en-US" smtClean="0"/>
-              <a:t>Friday, July 3, 2020</a:t>
+              <a:t>Tuesday, July 7, 2020</a:t>
             </a:fld>
             <a:endParaRPr lang="en-US"/>
           </a:p>
@@ -1521,7 +1526,7 @@
           <a:p>
             <a:fld id="{ABAE0CE1-F450-4107-B2CB-17B18F8A3F4A}" type="datetime2">
               <a:rPr lang="en-US" smtClean="0"/>
-              <a:t>Friday, July 3, 2020</a:t>
+              <a:t>Tuesday, July 7, 2020</a:t>
             </a:fld>
             <a:endParaRPr lang="en-US"/>
           </a:p>
@@ -2186,7 +2191,7 @@
           <a:p>
             <a:fld id="{6FE8C025-CD7A-4966-867E-81CF82B15267}" type="datetime2">
               <a:rPr lang="en-US" smtClean="0"/>
-              <a:t>Friday, July 3, 2020</a:t>
+              <a:t>Tuesday, July 7, 2020</a:t>
             </a:fld>
             <a:endParaRPr lang="en-US"/>
           </a:p>
@@ -2806,7 +2811,7 @@
           <a:p>
             <a:fld id="{FE809929-0719-4517-94D6-FDF7F99E70F6}" type="datetime2">
               <a:rPr lang="en-US" smtClean="0"/>
-              <a:t>Friday, July 3, 2020</a:t>
+              <a:t>Tuesday, July 7, 2020</a:t>
             </a:fld>
             <a:endParaRPr lang="en-US"/>
           </a:p>
@@ -3924,7 +3929,7 @@
           <a:p>
             <a:fld id="{20E95673-5512-4AAA-9AEB-E00C61EC65D5}" type="datetime2">
               <a:rPr lang="en-US" smtClean="0"/>
-              <a:t>Friday, July 3, 2020</a:t>
+              <a:t>Tuesday, July 7, 2020</a:t>
             </a:fld>
             <a:endParaRPr lang="en-US"/>
           </a:p>
@@ -4471,7 +4476,7 @@
           <a:p>
             <a:fld id="{C13138FA-2E87-4873-8BBA-13E447C9A99A}" type="datetime2">
               <a:rPr lang="en-US" smtClean="0"/>
-              <a:t>Friday, July 3, 2020</a:t>
+              <a:t>Tuesday, July 7, 2020</a:t>
             </a:fld>
             <a:endParaRPr lang="en-US"/>
           </a:p>
@@ -4632,7 +4637,7 @@
           <a:p>
             <a:fld id="{D75BB40A-97BD-4BFB-B639-0BFF95FDE8B7}" type="datetime2">
               <a:rPr lang="en-US" smtClean="0"/>
-              <a:t>Friday, July 3, 2020</a:t>
+              <a:t>Tuesday, July 7, 2020</a:t>
             </a:fld>
             <a:endParaRPr lang="en-US"/>
           </a:p>
@@ -5667,7 +5672,7 @@
           <a:p>
             <a:fld id="{9EE9E0E3-ECF6-4CFE-8698-AEFEBCECC3C0}" type="datetime2">
               <a:rPr lang="en-US" smtClean="0"/>
-              <a:t>Friday, July 3, 2020</a:t>
+              <a:t>Tuesday, July 7, 2020</a:t>
             </a:fld>
             <a:endParaRPr lang="en-US"/>
           </a:p>
@@ -6313,7 +6318,7 @@
           <a:p>
             <a:fld id="{251462FC-960E-4740-921F-B36862979F21}" type="datetime2">
               <a:rPr lang="en-US" smtClean="0"/>
-              <a:t>Friday, July 3, 2020</a:t>
+              <a:t>Tuesday, July 7, 2020</a:t>
             </a:fld>
             <a:endParaRPr lang="en-US"/>
           </a:p>
@@ -7077,7 +7082,7 @@
           <a:p>
             <a:fld id="{E50BC9E2-CB44-4C05-9BB5-496C18A241E0}" type="datetime2">
               <a:rPr lang="en-US" smtClean="0"/>
-              <a:t>Friday, July 3, 2020</a:t>
+              <a:t>Tuesday, July 7, 2020</a:t>
             </a:fld>
             <a:endParaRPr lang="en-US"/>
           </a:p>
@@ -7333,7 +7338,7 @@
           <a:p>
             <a:fld id="{246CB39B-5F4C-4A7E-9BE3-AAFD45576D16}" type="datetime2">
               <a:rPr lang="en-US" smtClean="0"/>
-              <a:t>Friday, July 3, 2020</a:t>
+              <a:t>Tuesday, July 7, 2020</a:t>
             </a:fld>
             <a:endParaRPr lang="en-US" dirty="0"/>
           </a:p>
@@ -8390,7 +8395,7 @@
         <p:spPr>
           <a:xfrm>
             <a:off x="4515075" y="549275"/>
-            <a:ext cx="7045200" cy="5759451"/>
+            <a:ext cx="7045200" cy="5759450"/>
           </a:xfrm>
           <a:prstGeom prst="roundRect">
             <a:avLst>
@@ -9495,7 +9500,7 @@
         <p:spPr>
           <a:xfrm>
             <a:off x="5540825" y="1840302"/>
-            <a:ext cx="4949370" cy="3539430"/>
+            <a:ext cx="4949370" cy="3046988"/>
           </a:xfrm>
           <a:prstGeom prst="rect">
             <a:avLst/>
@@ -9546,10 +9551,9 @@
               <a:buChar char="•"/>
             </a:pPr>
             <a:r>
-              <a:rPr lang="en-US" sz="3200" dirty="0" err="1"/>
-              <a:t>OpenFeign</a:t>
-            </a:r>
-            <a:endParaRPr lang="en-US" sz="3200" dirty="0"/>
+              <a:rPr lang="en-US" sz="3200" dirty="0"/>
+              <a:t>OAuth2</a:t>
+            </a:r>
           </a:p>
           <a:p>
             <a:pPr marL="285750" indent="-285750">
@@ -9558,17 +9562,7 @@
             </a:pPr>
             <a:r>
               <a:rPr lang="en-US" sz="3200" dirty="0"/>
-              <a:t>OAuth2</a:t>
-            </a:r>
-          </a:p>
-          <a:p>
-            <a:pPr marL="285750" indent="-285750">
-              <a:buFont typeface="Arial" panose="020B0604020202020204" pitchFamily="34" charset="0"/>
-              <a:buChar char="•"/>
-            </a:pPr>
-            <a:r>
-              <a:rPr lang="en-US" sz="3200" dirty="0"/>
-              <a:t>Okta</a:t>
+              <a:t>GitHub</a:t>
             </a:r>
           </a:p>
           <a:p>

</xml_diff>